<commit_message>
documentation updated with motivation
</commit_message>
<xml_diff>
--- a/docs/3d_tracking_presentation.pptx
+++ b/docs/3d_tracking_presentation.pptx
@@ -206,7 +206,7 @@
           <a:p>
             <a:fld id="{EEDF0283-888B-43AA-96EA-98DE66BDD96F}" type="datetimeFigureOut">
               <a:rPr lang="de-DE" smtClean="0"/>
-              <a:t>09.05.2018</a:t>
+              <a:t>10.05.2018</a:t>
             </a:fld>
             <a:endParaRPr lang="de-DE"/>
           </a:p>
@@ -827,7 +827,7 @@
           <a:p>
             <a:fld id="{7422A806-AE6E-4C68-8D6D-303A3D0B96B3}" type="datetimeFigureOut">
               <a:rPr lang="de-DE" smtClean="0"/>
-              <a:t>09.05.2018</a:t>
+              <a:t>10.05.2018</a:t>
             </a:fld>
             <a:endParaRPr lang="de-DE"/>
           </a:p>
@@ -997,7 +997,7 @@
           <a:p>
             <a:fld id="{7422A806-AE6E-4C68-8D6D-303A3D0B96B3}" type="datetimeFigureOut">
               <a:rPr lang="de-DE" smtClean="0"/>
-              <a:t>09.05.2018</a:t>
+              <a:t>10.05.2018</a:t>
             </a:fld>
             <a:endParaRPr lang="de-DE"/>
           </a:p>
@@ -1177,7 +1177,7 @@
           <a:p>
             <a:fld id="{7422A806-AE6E-4C68-8D6D-303A3D0B96B3}" type="datetimeFigureOut">
               <a:rPr lang="de-DE" smtClean="0"/>
-              <a:t>09.05.2018</a:t>
+              <a:t>10.05.2018</a:t>
             </a:fld>
             <a:endParaRPr lang="de-DE"/>
           </a:p>
@@ -1347,7 +1347,7 @@
           <a:p>
             <a:fld id="{7422A806-AE6E-4C68-8D6D-303A3D0B96B3}" type="datetimeFigureOut">
               <a:rPr lang="de-DE" smtClean="0"/>
-              <a:t>09.05.2018</a:t>
+              <a:t>10.05.2018</a:t>
             </a:fld>
             <a:endParaRPr lang="de-DE"/>
           </a:p>
@@ -1593,7 +1593,7 @@
           <a:p>
             <a:fld id="{7422A806-AE6E-4C68-8D6D-303A3D0B96B3}" type="datetimeFigureOut">
               <a:rPr lang="de-DE" smtClean="0"/>
-              <a:t>09.05.2018</a:t>
+              <a:t>10.05.2018</a:t>
             </a:fld>
             <a:endParaRPr lang="de-DE"/>
           </a:p>
@@ -1825,7 +1825,7 @@
           <a:p>
             <a:fld id="{7422A806-AE6E-4C68-8D6D-303A3D0B96B3}" type="datetimeFigureOut">
               <a:rPr lang="de-DE" smtClean="0"/>
-              <a:t>09.05.2018</a:t>
+              <a:t>10.05.2018</a:t>
             </a:fld>
             <a:endParaRPr lang="de-DE"/>
           </a:p>
@@ -2192,7 +2192,7 @@
           <a:p>
             <a:fld id="{7422A806-AE6E-4C68-8D6D-303A3D0B96B3}" type="datetimeFigureOut">
               <a:rPr lang="de-DE" smtClean="0"/>
-              <a:t>09.05.2018</a:t>
+              <a:t>10.05.2018</a:t>
             </a:fld>
             <a:endParaRPr lang="de-DE"/>
           </a:p>
@@ -2310,7 +2310,7 @@
           <a:p>
             <a:fld id="{7422A806-AE6E-4C68-8D6D-303A3D0B96B3}" type="datetimeFigureOut">
               <a:rPr lang="de-DE" smtClean="0"/>
-              <a:t>09.05.2018</a:t>
+              <a:t>10.05.2018</a:t>
             </a:fld>
             <a:endParaRPr lang="de-DE"/>
           </a:p>
@@ -2405,7 +2405,7 @@
           <a:p>
             <a:fld id="{7422A806-AE6E-4C68-8D6D-303A3D0B96B3}" type="datetimeFigureOut">
               <a:rPr lang="de-DE" smtClean="0"/>
-              <a:t>09.05.2018</a:t>
+              <a:t>10.05.2018</a:t>
             </a:fld>
             <a:endParaRPr lang="de-DE"/>
           </a:p>
@@ -2682,7 +2682,7 @@
           <a:p>
             <a:fld id="{7422A806-AE6E-4C68-8D6D-303A3D0B96B3}" type="datetimeFigureOut">
               <a:rPr lang="de-DE" smtClean="0"/>
-              <a:t>09.05.2018</a:t>
+              <a:t>10.05.2018</a:t>
             </a:fld>
             <a:endParaRPr lang="de-DE"/>
           </a:p>
@@ -2939,7 +2939,7 @@
           <a:p>
             <a:fld id="{7422A806-AE6E-4C68-8D6D-303A3D0B96B3}" type="datetimeFigureOut">
               <a:rPr lang="de-DE" smtClean="0"/>
-              <a:t>09.05.2018</a:t>
+              <a:t>10.05.2018</a:t>
             </a:fld>
             <a:endParaRPr lang="de-DE"/>
           </a:p>
@@ -3152,7 +3152,7 @@
           <a:p>
             <a:fld id="{7422A806-AE6E-4C68-8D6D-303A3D0B96B3}" type="datetimeFigureOut">
               <a:rPr lang="de-DE" smtClean="0"/>
-              <a:t>09.05.2018</a:t>
+              <a:t>10.05.2018</a:t>
             </a:fld>
             <a:endParaRPr lang="de-DE"/>
           </a:p>
@@ -6656,7 +6656,7 @@
                 <a:ea typeface="+mj-ea"/>
                 <a:cs typeface="GreekS_IV50" panose="00000400000000000000" pitchFamily="2" charset="0"/>
               </a:rPr>
-              <a:t>IMU alapú kontroller</a:t>
+              <a:t>IMU alapú kontroller VR-rendszerekhez</a:t>
             </a:r>
           </a:p>
           <a:p>
@@ -6674,7 +6674,7 @@
                 <a:ea typeface="+mj-ea"/>
                 <a:cs typeface="GreekS_IV50" panose="00000400000000000000" pitchFamily="2" charset="0"/>
               </a:rPr>
-              <a:t>Relatív pozíció számítható</a:t>
+              <a:t>Relatív pozíció számítható, azonban nincs referencia</a:t>
             </a:r>
           </a:p>
           <a:p>
@@ -6694,6 +6694,43 @@
               </a:rPr>
               <a:t>Külső kamerarendszer	 pozícióhiba meghatározása</a:t>
             </a:r>
+          </a:p>
+          <a:p>
+            <a:pPr>
+              <a:spcBef>
+                <a:spcPct val="0"/>
+              </a:spcBef>
+            </a:pPr>
+            <a:r>
+              <a:rPr lang="hu-HU" dirty="0">
+                <a:solidFill>
+                  <a:srgbClr val="17346E"/>
+                </a:solidFill>
+                <a:latin typeface="Helvetica Neue LT com 47 light condensed oblique" panose="020B0406020202030204" pitchFamily="34" charset="-18"/>
+                <a:ea typeface="+mj-ea"/>
+                <a:cs typeface="GreekS_IV50" panose="00000400000000000000" pitchFamily="2" charset="0"/>
+              </a:rPr>
+              <a:t>Fejlesztési </a:t>
+            </a:r>
+            <a:r>
+              <a:rPr lang="hu-HU">
+                <a:solidFill>
+                  <a:srgbClr val="17346E"/>
+                </a:solidFill>
+                <a:latin typeface="Helvetica Neue LT com 47 light condensed oblique" panose="020B0406020202030204" pitchFamily="34" charset="-18"/>
+                <a:ea typeface="+mj-ea"/>
+                <a:cs typeface="GreekS_IV50" panose="00000400000000000000" pitchFamily="2" charset="0"/>
+              </a:rPr>
+              <a:t>folyamat egyszerűbbé tehető</a:t>
+            </a:r>
+            <a:endParaRPr lang="hu-HU" dirty="0">
+              <a:solidFill>
+                <a:srgbClr val="17346E"/>
+              </a:solidFill>
+              <a:latin typeface="Helvetica Neue LT com 47 light condensed oblique" panose="020B0406020202030204" pitchFamily="34" charset="-18"/>
+              <a:ea typeface="+mj-ea"/>
+              <a:cs typeface="GreekS_IV50" panose="00000400000000000000" pitchFamily="2" charset="0"/>
+            </a:endParaRPr>
           </a:p>
           <a:p>
             <a:pPr marL="0" indent="0">

</xml_diff>